<commit_message>
paper for shloka and meaning
</commit_message>
<xml_diff>
--- a/feeder/tools/pics-making.pptx
+++ b/feeder/tools/pics-making.pptx
@@ -310,7 +310,7 @@
           <a:p>
             <a:fld id="{56E5DCE2-4C0C-4B49-9538-1E32127C0620}" type="datetimeFigureOut">
               <a:rPr lang="en-IN" smtClean="0"/>
-              <a:t>08-05-2023</a:t>
+              <a:t>03-03-2024</a:t>
             </a:fld>
             <a:endParaRPr lang="en-IN"/>
           </a:p>
@@ -480,7 +480,7 @@
           <a:p>
             <a:fld id="{56E5DCE2-4C0C-4B49-9538-1E32127C0620}" type="datetimeFigureOut">
               <a:rPr lang="en-IN" smtClean="0"/>
-              <a:t>08-05-2023</a:t>
+              <a:t>03-03-2024</a:t>
             </a:fld>
             <a:endParaRPr lang="en-IN"/>
           </a:p>
@@ -660,7 +660,7 @@
           <a:p>
             <a:fld id="{56E5DCE2-4C0C-4B49-9538-1E32127C0620}" type="datetimeFigureOut">
               <a:rPr lang="en-IN" smtClean="0"/>
-              <a:t>08-05-2023</a:t>
+              <a:t>03-03-2024</a:t>
             </a:fld>
             <a:endParaRPr lang="en-IN"/>
           </a:p>
@@ -830,7 +830,7 @@
           <a:p>
             <a:fld id="{56E5DCE2-4C0C-4B49-9538-1E32127C0620}" type="datetimeFigureOut">
               <a:rPr lang="en-IN" smtClean="0"/>
-              <a:t>08-05-2023</a:t>
+              <a:t>03-03-2024</a:t>
             </a:fld>
             <a:endParaRPr lang="en-IN"/>
           </a:p>
@@ -1076,7 +1076,7 @@
           <a:p>
             <a:fld id="{56E5DCE2-4C0C-4B49-9538-1E32127C0620}" type="datetimeFigureOut">
               <a:rPr lang="en-IN" smtClean="0"/>
-              <a:t>08-05-2023</a:t>
+              <a:t>03-03-2024</a:t>
             </a:fld>
             <a:endParaRPr lang="en-IN"/>
           </a:p>
@@ -1364,7 +1364,7 @@
           <a:p>
             <a:fld id="{56E5DCE2-4C0C-4B49-9538-1E32127C0620}" type="datetimeFigureOut">
               <a:rPr lang="en-IN" smtClean="0"/>
-              <a:t>08-05-2023</a:t>
+              <a:t>03-03-2024</a:t>
             </a:fld>
             <a:endParaRPr lang="en-IN"/>
           </a:p>
@@ -1786,7 +1786,7 @@
           <a:p>
             <a:fld id="{56E5DCE2-4C0C-4B49-9538-1E32127C0620}" type="datetimeFigureOut">
               <a:rPr lang="en-IN" smtClean="0"/>
-              <a:t>08-05-2023</a:t>
+              <a:t>03-03-2024</a:t>
             </a:fld>
             <a:endParaRPr lang="en-IN"/>
           </a:p>
@@ -1904,7 +1904,7 @@
           <a:p>
             <a:fld id="{56E5DCE2-4C0C-4B49-9538-1E32127C0620}" type="datetimeFigureOut">
               <a:rPr lang="en-IN" smtClean="0"/>
-              <a:t>08-05-2023</a:t>
+              <a:t>03-03-2024</a:t>
             </a:fld>
             <a:endParaRPr lang="en-IN"/>
           </a:p>
@@ -1999,7 +1999,7 @@
           <a:p>
             <a:fld id="{56E5DCE2-4C0C-4B49-9538-1E32127C0620}" type="datetimeFigureOut">
               <a:rPr lang="en-IN" smtClean="0"/>
-              <a:t>08-05-2023</a:t>
+              <a:t>03-03-2024</a:t>
             </a:fld>
             <a:endParaRPr lang="en-IN"/>
           </a:p>
@@ -2276,7 +2276,7 @@
           <a:p>
             <a:fld id="{56E5DCE2-4C0C-4B49-9538-1E32127C0620}" type="datetimeFigureOut">
               <a:rPr lang="en-IN" smtClean="0"/>
-              <a:t>08-05-2023</a:t>
+              <a:t>03-03-2024</a:t>
             </a:fld>
             <a:endParaRPr lang="en-IN"/>
           </a:p>
@@ -2529,7 +2529,7 @@
           <a:p>
             <a:fld id="{56E5DCE2-4C0C-4B49-9538-1E32127C0620}" type="datetimeFigureOut">
               <a:rPr lang="en-IN" smtClean="0"/>
-              <a:t>08-05-2023</a:t>
+              <a:t>03-03-2024</a:t>
             </a:fld>
             <a:endParaRPr lang="en-IN"/>
           </a:p>
@@ -2742,7 +2742,7 @@
           <a:p>
             <a:fld id="{56E5DCE2-4C0C-4B49-9538-1E32127C0620}" type="datetimeFigureOut">
               <a:rPr lang="en-IN" smtClean="0"/>
-              <a:t>08-05-2023</a:t>
+              <a:t>03-03-2024</a:t>
             </a:fld>
             <a:endParaRPr lang="en-IN"/>
           </a:p>
@@ -3125,7 +3125,7 @@
         </p:nvSpPr>
         <p:spPr>
           <a:xfrm>
-            <a:off x="1676400" y="1219200"/>
+            <a:off x="1676400" y="228600"/>
             <a:ext cx="2057400" cy="914400"/>
           </a:xfrm>
           <a:prstGeom prst="rect">
@@ -3194,7 +3194,7 @@
         </p:nvCxnSpPr>
         <p:spPr>
           <a:xfrm>
-            <a:off x="1905000" y="1497775"/>
+            <a:off x="1905000" y="507175"/>
             <a:ext cx="1219200" cy="0"/>
           </a:xfrm>
           <a:prstGeom prst="line">
@@ -3224,7 +3224,7 @@
         </p:nvCxnSpPr>
         <p:spPr>
           <a:xfrm>
-            <a:off x="1905000" y="1776350"/>
+            <a:off x="1905000" y="785750"/>
             <a:ext cx="1371600" cy="0"/>
           </a:xfrm>
           <a:prstGeom prst="line">
@@ -3254,7 +3254,7 @@
         </p:nvCxnSpPr>
         <p:spPr>
           <a:xfrm>
-            <a:off x="3200400" y="1471550"/>
+            <a:off x="3200400" y="480950"/>
             <a:ext cx="0" cy="182880"/>
           </a:xfrm>
           <a:prstGeom prst="line">
@@ -3284,7 +3284,7 @@
         </p:nvCxnSpPr>
         <p:spPr>
           <a:xfrm>
-            <a:off x="3352800" y="1738250"/>
+            <a:off x="3352800" y="747650"/>
             <a:ext cx="0" cy="182880"/>
           </a:xfrm>
           <a:prstGeom prst="line">
@@ -3314,7 +3314,7 @@
         </p:nvCxnSpPr>
         <p:spPr>
           <a:xfrm>
-            <a:off x="3445825" y="1738250"/>
+            <a:off x="3445825" y="747650"/>
             <a:ext cx="0" cy="182880"/>
           </a:xfrm>
           <a:prstGeom prst="line">
@@ -3357,7 +3357,7 @@
         </p:blipFill>
         <p:spPr bwMode="auto">
           <a:xfrm>
-            <a:off x="2290521" y="2244436"/>
+            <a:off x="2290521" y="1253836"/>
             <a:ext cx="600558" cy="228600"/>
           </a:xfrm>
           <a:prstGeom prst="rect">
@@ -3406,7 +3406,7 @@
         </p:nvSpPr>
         <p:spPr>
           <a:xfrm>
-            <a:off x="5791200" y="838200"/>
+            <a:off x="5791200" y="228600"/>
             <a:ext cx="1524000" cy="816230"/>
           </a:xfrm>
           <a:prstGeom prst="rect">
@@ -3420,6 +3420,244 @@
                     <a14:imgLayer r:embed="rId3">
                       <a14:imgEffect>
                         <a14:saturation sat="300000"/>
+                      </a14:imgEffect>
+                    </a14:imgLayer>
+                  </a14:imgProps>
+                </a:ext>
+              </a:extLst>
+            </a:blip>
+            <a:tile tx="0" ty="0" sx="100000" sy="100000" flip="none" algn="tl"/>
+          </a:blipFill>
+          <a:ln>
+            <a:noFill/>
+          </a:ln>
+        </p:spPr>
+        <p:style>
+          <a:lnRef idx="2">
+            <a:schemeClr val="accent1">
+              <a:shade val="50000"/>
+            </a:schemeClr>
+          </a:lnRef>
+          <a:fillRef idx="1">
+            <a:schemeClr val="accent1"/>
+          </a:fillRef>
+          <a:effectRef idx="0">
+            <a:schemeClr val="accent1"/>
+          </a:effectRef>
+          <a:fontRef idx="minor">
+            <a:schemeClr val="lt1"/>
+          </a:fontRef>
+        </p:style>
+        <p:txBody>
+          <a:bodyPr rtlCol="0" anchor="ctr"/>
+          <a:lstStyle/>
+          <a:p>
+            <a:pPr algn="ctr"/>
+            <a:endParaRPr lang="en-IN"/>
+          </a:p>
+        </p:txBody>
+      </p:sp>
+      <p:pic>
+        <p:nvPicPr>
+          <p:cNvPr id="5" name="Picture 4">
+            <a:extLst>
+              <a:ext uri="{FF2B5EF4-FFF2-40B4-BE49-F238E27FC236}">
+                <a16:creationId xmlns:a16="http://schemas.microsoft.com/office/drawing/2014/main" id="{BF9489F6-5B93-B6F6-8254-662FF7FFCBD3}"/>
+              </a:ext>
+            </a:extLst>
+          </p:cNvPr>
+          <p:cNvPicPr>
+            <a:picLocks noChangeAspect="1"/>
+          </p:cNvPicPr>
+          <p:nvPr/>
+        </p:nvPicPr>
+        <p:blipFill>
+          <a:blip r:embed="rId6">
+            <a:extLst>
+              <a:ext uri="{BEBA8EAE-BF5A-486C-A8C5-ECC9F3942E4B}">
+                <a14:imgProps xmlns:a14="http://schemas.microsoft.com/office/drawing/2010/main">
+                  <a14:imgLayer r:embed="rId7">
+                    <a14:imgEffect>
+                      <a14:artisticGlowDiffused/>
+                    </a14:imgEffect>
+                  </a14:imgLayer>
+                </a14:imgProps>
+              </a:ext>
+            </a:extLst>
+          </a:blip>
+          <a:stretch>
+            <a:fillRect/>
+          </a:stretch>
+        </p:blipFill>
+        <p:spPr>
+          <a:xfrm>
+            <a:off x="395287" y="1862138"/>
+            <a:ext cx="1966913" cy="923130"/>
+          </a:xfrm>
+          <a:prstGeom prst="rect">
+            <a:avLst/>
+          </a:prstGeom>
+        </p:spPr>
+      </p:pic>
+      <p:pic>
+        <p:nvPicPr>
+          <p:cNvPr id="8" name="Picture 7">
+            <a:extLst>
+              <a:ext uri="{FF2B5EF4-FFF2-40B4-BE49-F238E27FC236}">
+                <a16:creationId xmlns:a16="http://schemas.microsoft.com/office/drawing/2014/main" id="{1E8611A4-6DD0-ACD9-B4F8-8D4400000B4D}"/>
+              </a:ext>
+            </a:extLst>
+          </p:cNvPr>
+          <p:cNvPicPr>
+            <a:picLocks noChangeAspect="1"/>
+          </p:cNvPicPr>
+          <p:nvPr/>
+        </p:nvPicPr>
+        <p:blipFill>
+          <a:blip r:embed="rId8">
+            <a:duotone>
+              <a:prstClr val="black"/>
+              <a:srgbClr val="D9C3A5">
+                <a:tint val="50000"/>
+                <a:satMod val="180000"/>
+              </a:srgbClr>
+            </a:duotone>
+            <a:extLst>
+              <a:ext uri="{BEBA8EAE-BF5A-486C-A8C5-ECC9F3942E4B}">
+                <a14:imgProps xmlns:a14="http://schemas.microsoft.com/office/drawing/2010/main">
+                  <a14:imgLayer r:embed="rId7">
+                    <a14:imgEffect>
+                      <a14:artisticGlowEdges/>
+                    </a14:imgEffect>
+                    <a14:imgEffect>
+                      <a14:colorTemperature colorTemp="11500"/>
+                    </a14:imgEffect>
+                    <a14:imgEffect>
+                      <a14:saturation sat="0"/>
+                    </a14:imgEffect>
+                  </a14:imgLayer>
+                </a14:imgProps>
+              </a:ext>
+            </a:extLst>
+          </a:blip>
+          <a:stretch>
+            <a:fillRect/>
+          </a:stretch>
+        </p:blipFill>
+        <p:spPr>
+          <a:xfrm>
+            <a:off x="2462368" y="1862138"/>
+            <a:ext cx="1966914" cy="923130"/>
+          </a:xfrm>
+          <a:prstGeom prst="rect">
+            <a:avLst/>
+          </a:prstGeom>
+        </p:spPr>
+      </p:pic>
+      <p:sp>
+        <p:nvSpPr>
+          <p:cNvPr id="9" name="Rectangle 8">
+            <a:extLst>
+              <a:ext uri="{FF2B5EF4-FFF2-40B4-BE49-F238E27FC236}">
+                <a16:creationId xmlns:a16="http://schemas.microsoft.com/office/drawing/2014/main" id="{F4303A74-E12C-8175-32A0-9D7D268AE58B}"/>
+              </a:ext>
+            </a:extLst>
+          </p:cNvPr>
+          <p:cNvSpPr/>
+          <p:nvPr/>
+        </p:nvSpPr>
+        <p:spPr>
+          <a:xfrm>
+            <a:off x="7237414" y="1253836"/>
+            <a:ext cx="1524000" cy="816230"/>
+          </a:xfrm>
+          <a:prstGeom prst="rect">
+            <a:avLst/>
+          </a:prstGeom>
+          <a:blipFill>
+            <a:blip r:embed="rId9">
+              <a:grayscl/>
+              <a:extLst>
+                <a:ext uri="{BEBA8EAE-BF5A-486C-A8C5-ECC9F3942E4B}">
+                  <a14:imgProps xmlns:a14="http://schemas.microsoft.com/office/drawing/2010/main">
+                    <a14:imgLayer r:embed="rId3">
+                      <a14:imgEffect>
+                        <a14:colorTemperature colorTemp="5245"/>
+                      </a14:imgEffect>
+                      <a14:imgEffect>
+                        <a14:saturation sat="400000"/>
+                      </a14:imgEffect>
+                    </a14:imgLayer>
+                  </a14:imgProps>
+                </a:ext>
+              </a:extLst>
+            </a:blip>
+            <a:tile tx="0" ty="0" sx="100000" sy="100000" flip="none" algn="tl"/>
+          </a:blipFill>
+          <a:ln>
+            <a:noFill/>
+          </a:ln>
+        </p:spPr>
+        <p:style>
+          <a:lnRef idx="2">
+            <a:schemeClr val="accent1">
+              <a:shade val="50000"/>
+            </a:schemeClr>
+          </a:lnRef>
+          <a:fillRef idx="1">
+            <a:schemeClr val="accent1"/>
+          </a:fillRef>
+          <a:effectRef idx="0">
+            <a:schemeClr val="accent1"/>
+          </a:effectRef>
+          <a:fontRef idx="minor">
+            <a:schemeClr val="lt1"/>
+          </a:fontRef>
+        </p:style>
+        <p:txBody>
+          <a:bodyPr rtlCol="0" anchor="ctr"/>
+          <a:lstStyle/>
+          <a:p>
+            <a:pPr algn="ctr"/>
+            <a:endParaRPr lang="en-IN"/>
+          </a:p>
+        </p:txBody>
+      </p:sp>
+      <p:sp>
+        <p:nvSpPr>
+          <p:cNvPr id="15" name="Rectangle 14">
+            <a:extLst>
+              <a:ext uri="{FF2B5EF4-FFF2-40B4-BE49-F238E27FC236}">
+                <a16:creationId xmlns:a16="http://schemas.microsoft.com/office/drawing/2014/main" id="{EDE2EE44-314F-30D3-DBCF-6FA68546D0D1}"/>
+              </a:ext>
+            </a:extLst>
+          </p:cNvPr>
+          <p:cNvSpPr/>
+          <p:nvPr/>
+        </p:nvSpPr>
+        <p:spPr>
+          <a:xfrm>
+            <a:off x="7237414" y="2279072"/>
+            <a:ext cx="1524000" cy="816230"/>
+          </a:xfrm>
+          <a:prstGeom prst="rect">
+            <a:avLst/>
+          </a:prstGeom>
+          <a:blipFill>
+            <a:blip r:embed="rId10">
+              <a:grayscl/>
+              <a:extLst>
+                <a:ext uri="{BEBA8EAE-BF5A-486C-A8C5-ECC9F3942E4B}">
+                  <a14:imgProps xmlns:a14="http://schemas.microsoft.com/office/drawing/2010/main">
+                    <a14:imgLayer r:embed="rId3">
+                      <a14:imgEffect>
+                        <a14:artisticGlowEdges trans="13000" smoothness="6"/>
+                      </a14:imgEffect>
+                      <a14:imgEffect>
+                        <a14:colorTemperature colorTemp="5245"/>
+                      </a14:imgEffect>
+                      <a14:imgEffect>
+                        <a14:saturation sat="400000"/>
                       </a14:imgEffect>
                     </a14:imgLayer>
                   </a14:imgProps>

</xml_diff>

<commit_message>
spacing and icon size
</commit_message>
<xml_diff>
--- a/feeder/tools/pics-making.pptx
+++ b/feeder/tools/pics-making.pptx
@@ -310,7 +310,7 @@
           <a:p>
             <a:fld id="{56E5DCE2-4C0C-4B49-9538-1E32127C0620}" type="datetimeFigureOut">
               <a:rPr lang="en-IN" smtClean="0"/>
-              <a:t>03-03-2024</a:t>
+              <a:t>17-03-2024</a:t>
             </a:fld>
             <a:endParaRPr lang="en-IN"/>
           </a:p>
@@ -480,7 +480,7 @@
           <a:p>
             <a:fld id="{56E5DCE2-4C0C-4B49-9538-1E32127C0620}" type="datetimeFigureOut">
               <a:rPr lang="en-IN" smtClean="0"/>
-              <a:t>03-03-2024</a:t>
+              <a:t>17-03-2024</a:t>
             </a:fld>
             <a:endParaRPr lang="en-IN"/>
           </a:p>
@@ -660,7 +660,7 @@
           <a:p>
             <a:fld id="{56E5DCE2-4C0C-4B49-9538-1E32127C0620}" type="datetimeFigureOut">
               <a:rPr lang="en-IN" smtClean="0"/>
-              <a:t>03-03-2024</a:t>
+              <a:t>17-03-2024</a:t>
             </a:fld>
             <a:endParaRPr lang="en-IN"/>
           </a:p>
@@ -830,7 +830,7 @@
           <a:p>
             <a:fld id="{56E5DCE2-4C0C-4B49-9538-1E32127C0620}" type="datetimeFigureOut">
               <a:rPr lang="en-IN" smtClean="0"/>
-              <a:t>03-03-2024</a:t>
+              <a:t>17-03-2024</a:t>
             </a:fld>
             <a:endParaRPr lang="en-IN"/>
           </a:p>
@@ -1076,7 +1076,7 @@
           <a:p>
             <a:fld id="{56E5DCE2-4C0C-4B49-9538-1E32127C0620}" type="datetimeFigureOut">
               <a:rPr lang="en-IN" smtClean="0"/>
-              <a:t>03-03-2024</a:t>
+              <a:t>17-03-2024</a:t>
             </a:fld>
             <a:endParaRPr lang="en-IN"/>
           </a:p>
@@ -1364,7 +1364,7 @@
           <a:p>
             <a:fld id="{56E5DCE2-4C0C-4B49-9538-1E32127C0620}" type="datetimeFigureOut">
               <a:rPr lang="en-IN" smtClean="0"/>
-              <a:t>03-03-2024</a:t>
+              <a:t>17-03-2024</a:t>
             </a:fld>
             <a:endParaRPr lang="en-IN"/>
           </a:p>
@@ -1786,7 +1786,7 @@
           <a:p>
             <a:fld id="{56E5DCE2-4C0C-4B49-9538-1E32127C0620}" type="datetimeFigureOut">
               <a:rPr lang="en-IN" smtClean="0"/>
-              <a:t>03-03-2024</a:t>
+              <a:t>17-03-2024</a:t>
             </a:fld>
             <a:endParaRPr lang="en-IN"/>
           </a:p>
@@ -1904,7 +1904,7 @@
           <a:p>
             <a:fld id="{56E5DCE2-4C0C-4B49-9538-1E32127C0620}" type="datetimeFigureOut">
               <a:rPr lang="en-IN" smtClean="0"/>
-              <a:t>03-03-2024</a:t>
+              <a:t>17-03-2024</a:t>
             </a:fld>
             <a:endParaRPr lang="en-IN"/>
           </a:p>
@@ -1999,7 +1999,7 @@
           <a:p>
             <a:fld id="{56E5DCE2-4C0C-4B49-9538-1E32127C0620}" type="datetimeFigureOut">
               <a:rPr lang="en-IN" smtClean="0"/>
-              <a:t>03-03-2024</a:t>
+              <a:t>17-03-2024</a:t>
             </a:fld>
             <a:endParaRPr lang="en-IN"/>
           </a:p>
@@ -2276,7 +2276,7 @@
           <a:p>
             <a:fld id="{56E5DCE2-4C0C-4B49-9538-1E32127C0620}" type="datetimeFigureOut">
               <a:rPr lang="en-IN" smtClean="0"/>
-              <a:t>03-03-2024</a:t>
+              <a:t>17-03-2024</a:t>
             </a:fld>
             <a:endParaRPr lang="en-IN"/>
           </a:p>
@@ -2529,7 +2529,7 @@
           <a:p>
             <a:fld id="{56E5DCE2-4C0C-4B49-9538-1E32127C0620}" type="datetimeFigureOut">
               <a:rPr lang="en-IN" smtClean="0"/>
-              <a:t>03-03-2024</a:t>
+              <a:t>17-03-2024</a:t>
             </a:fld>
             <a:endParaRPr lang="en-IN"/>
           </a:p>
@@ -2742,7 +2742,7 @@
           <a:p>
             <a:fld id="{56E5DCE2-4C0C-4B49-9538-1E32127C0620}" type="datetimeFigureOut">
               <a:rPr lang="en-IN" smtClean="0"/>
-              <a:t>03-03-2024</a:t>
+              <a:t>17-03-2024</a:t>
             </a:fld>
             <a:endParaRPr lang="en-IN"/>
           </a:p>
@@ -3695,6 +3695,41 @@
           </a:p>
         </p:txBody>
       </p:sp>
+      <p:pic>
+        <p:nvPicPr>
+          <p:cNvPr id="3" name="Picture 2">
+            <a:extLst>
+              <a:ext uri="{FF2B5EF4-FFF2-40B4-BE49-F238E27FC236}">
+                <a16:creationId xmlns:a16="http://schemas.microsoft.com/office/drawing/2014/main" id="{540AB198-1375-4B56-1E6E-323AEEC3E6D1}"/>
+              </a:ext>
+            </a:extLst>
+          </p:cNvPr>
+          <p:cNvPicPr>
+            <a:picLocks noChangeAspect="1"/>
+          </p:cNvPicPr>
+          <p:nvPr/>
+        </p:nvPicPr>
+        <p:blipFill rotWithShape="1">
+          <a:blip r:embed="rId11">
+            <a:extLst>
+              <a:ext uri="{28A0092B-C50C-407E-A947-70E740481C1C}">
+                <a14:useLocalDpi xmlns:a14="http://schemas.microsoft.com/office/drawing/2010/main" val="0"/>
+              </a:ext>
+            </a:extLst>
+          </a:blip>
+          <a:srcRect l="12135" t="13020" r="15056" b="21882"/>
+          <a:stretch/>
+        </p:blipFill>
+        <p:spPr>
+          <a:xfrm>
+            <a:off x="762000" y="3313906"/>
+            <a:ext cx="457200" cy="381000"/>
+          </a:xfrm>
+          <a:prstGeom prst="rect">
+            <a:avLst/>
+          </a:prstGeom>
+        </p:spPr>
+      </p:pic>
     </p:spTree>
     <p:extLst>
       <p:ext uri="{BB962C8B-B14F-4D97-AF65-F5344CB8AC3E}">

</xml_diff>

<commit_message>
light and dark icons
</commit_message>
<xml_diff>
--- a/feeder/tools/pics-making.pptx
+++ b/feeder/tools/pics-making.pptx
@@ -310,7 +310,7 @@
           <a:p>
             <a:fld id="{56E5DCE2-4C0C-4B49-9538-1E32127C0620}" type="datetimeFigureOut">
               <a:rPr lang="en-IN" smtClean="0"/>
-              <a:t>17-03-2024</a:t>
+              <a:t>18-03-2024</a:t>
             </a:fld>
             <a:endParaRPr lang="en-IN"/>
           </a:p>
@@ -480,7 +480,7 @@
           <a:p>
             <a:fld id="{56E5DCE2-4C0C-4B49-9538-1E32127C0620}" type="datetimeFigureOut">
               <a:rPr lang="en-IN" smtClean="0"/>
-              <a:t>17-03-2024</a:t>
+              <a:t>18-03-2024</a:t>
             </a:fld>
             <a:endParaRPr lang="en-IN"/>
           </a:p>
@@ -660,7 +660,7 @@
           <a:p>
             <a:fld id="{56E5DCE2-4C0C-4B49-9538-1E32127C0620}" type="datetimeFigureOut">
               <a:rPr lang="en-IN" smtClean="0"/>
-              <a:t>17-03-2024</a:t>
+              <a:t>18-03-2024</a:t>
             </a:fld>
             <a:endParaRPr lang="en-IN"/>
           </a:p>
@@ -830,7 +830,7 @@
           <a:p>
             <a:fld id="{56E5DCE2-4C0C-4B49-9538-1E32127C0620}" type="datetimeFigureOut">
               <a:rPr lang="en-IN" smtClean="0"/>
-              <a:t>17-03-2024</a:t>
+              <a:t>18-03-2024</a:t>
             </a:fld>
             <a:endParaRPr lang="en-IN"/>
           </a:p>
@@ -1076,7 +1076,7 @@
           <a:p>
             <a:fld id="{56E5DCE2-4C0C-4B49-9538-1E32127C0620}" type="datetimeFigureOut">
               <a:rPr lang="en-IN" smtClean="0"/>
-              <a:t>17-03-2024</a:t>
+              <a:t>18-03-2024</a:t>
             </a:fld>
             <a:endParaRPr lang="en-IN"/>
           </a:p>
@@ -1364,7 +1364,7 @@
           <a:p>
             <a:fld id="{56E5DCE2-4C0C-4B49-9538-1E32127C0620}" type="datetimeFigureOut">
               <a:rPr lang="en-IN" smtClean="0"/>
-              <a:t>17-03-2024</a:t>
+              <a:t>18-03-2024</a:t>
             </a:fld>
             <a:endParaRPr lang="en-IN"/>
           </a:p>
@@ -1786,7 +1786,7 @@
           <a:p>
             <a:fld id="{56E5DCE2-4C0C-4B49-9538-1E32127C0620}" type="datetimeFigureOut">
               <a:rPr lang="en-IN" smtClean="0"/>
-              <a:t>17-03-2024</a:t>
+              <a:t>18-03-2024</a:t>
             </a:fld>
             <a:endParaRPr lang="en-IN"/>
           </a:p>
@@ -1904,7 +1904,7 @@
           <a:p>
             <a:fld id="{56E5DCE2-4C0C-4B49-9538-1E32127C0620}" type="datetimeFigureOut">
               <a:rPr lang="en-IN" smtClean="0"/>
-              <a:t>17-03-2024</a:t>
+              <a:t>18-03-2024</a:t>
             </a:fld>
             <a:endParaRPr lang="en-IN"/>
           </a:p>
@@ -1999,7 +1999,7 @@
           <a:p>
             <a:fld id="{56E5DCE2-4C0C-4B49-9538-1E32127C0620}" type="datetimeFigureOut">
               <a:rPr lang="en-IN" smtClean="0"/>
-              <a:t>17-03-2024</a:t>
+              <a:t>18-03-2024</a:t>
             </a:fld>
             <a:endParaRPr lang="en-IN"/>
           </a:p>
@@ -2276,7 +2276,7 @@
           <a:p>
             <a:fld id="{56E5DCE2-4C0C-4B49-9538-1E32127C0620}" type="datetimeFigureOut">
               <a:rPr lang="en-IN" smtClean="0"/>
-              <a:t>17-03-2024</a:t>
+              <a:t>18-03-2024</a:t>
             </a:fld>
             <a:endParaRPr lang="en-IN"/>
           </a:p>
@@ -2529,7 +2529,7 @@
           <a:p>
             <a:fld id="{56E5DCE2-4C0C-4B49-9538-1E32127C0620}" type="datetimeFigureOut">
               <a:rPr lang="en-IN" smtClean="0"/>
-              <a:t>17-03-2024</a:t>
+              <a:t>18-03-2024</a:t>
             </a:fld>
             <a:endParaRPr lang="en-IN"/>
           </a:p>
@@ -2742,7 +2742,7 @@
           <a:p>
             <a:fld id="{56E5DCE2-4C0C-4B49-9538-1E32127C0620}" type="datetimeFigureOut">
               <a:rPr lang="en-IN" smtClean="0"/>
-              <a:t>17-03-2024</a:t>
+              <a:t>18-03-2024</a:t>
             </a:fld>
             <a:endParaRPr lang="en-IN"/>
           </a:p>
@@ -3828,6 +3828,110 @@
           <a:xfrm>
             <a:off x="2184605" y="3358408"/>
             <a:ext cx="355189" cy="360000"/>
+          </a:xfrm>
+          <a:prstGeom prst="rect">
+            <a:avLst/>
+          </a:prstGeom>
+        </p:spPr>
+      </p:pic>
+      <p:pic>
+        <p:nvPicPr>
+          <p:cNvPr id="2" name="Picture 1">
+            <a:extLst>
+              <a:ext uri="{FF2B5EF4-FFF2-40B4-BE49-F238E27FC236}">
+                <a16:creationId xmlns:a16="http://schemas.microsoft.com/office/drawing/2014/main" id="{665B1068-9238-3808-D3B1-F87029CE7832}"/>
+              </a:ext>
+            </a:extLst>
+          </p:cNvPr>
+          <p:cNvPicPr>
+            <a:picLocks noChangeAspect="1"/>
+          </p:cNvPicPr>
+          <p:nvPr/>
+        </p:nvPicPr>
+        <p:blipFill rotWithShape="1">
+          <a:blip r:embed="rId14" cstate="print">
+            <a:clrChange>
+              <a:clrFrom>
+                <a:srgbClr val="F6F6F6"/>
+              </a:clrFrom>
+              <a:clrTo>
+                <a:srgbClr val="F6F6F6">
+                  <a:alpha val="0"/>
+                </a:srgbClr>
+              </a:clrTo>
+            </a:clrChange>
+            <a:duotone>
+              <a:schemeClr val="accent1">
+                <a:shade val="45000"/>
+                <a:satMod val="135000"/>
+              </a:schemeClr>
+              <a:prstClr val="white"/>
+            </a:duotone>
+            <a:extLst>
+              <a:ext uri="{28A0092B-C50C-407E-A947-70E740481C1C}">
+                <a14:useLocalDpi xmlns:a14="http://schemas.microsoft.com/office/drawing/2010/main" val="0"/>
+              </a:ext>
+            </a:extLst>
+          </a:blip>
+          <a:srcRect l="4683" t="29453" r="4377" b="32215"/>
+          <a:stretch/>
+        </p:blipFill>
+        <p:spPr>
+          <a:xfrm>
+            <a:off x="1447800" y="4038600"/>
+            <a:ext cx="457200" cy="428266"/>
+          </a:xfrm>
+          <a:prstGeom prst="rect">
+            <a:avLst/>
+          </a:prstGeom>
+        </p:spPr>
+      </p:pic>
+      <p:pic>
+        <p:nvPicPr>
+          <p:cNvPr id="11" name="Picture 10">
+            <a:extLst>
+              <a:ext uri="{FF2B5EF4-FFF2-40B4-BE49-F238E27FC236}">
+                <a16:creationId xmlns:a16="http://schemas.microsoft.com/office/drawing/2014/main" id="{9C378B52-0397-C1A6-2EC9-23B5DB9AACEB}"/>
+              </a:ext>
+            </a:extLst>
+          </p:cNvPr>
+          <p:cNvPicPr>
+            <a:picLocks noChangeAspect="1"/>
+          </p:cNvPicPr>
+          <p:nvPr/>
+        </p:nvPicPr>
+        <p:blipFill rotWithShape="1">
+          <a:blip r:embed="rId15" cstate="print">
+            <a:clrChange>
+              <a:clrFrom>
+                <a:srgbClr val="F6F6F6"/>
+              </a:clrFrom>
+              <a:clrTo>
+                <a:srgbClr val="F6F6F6">
+                  <a:alpha val="0"/>
+                </a:srgbClr>
+              </a:clrTo>
+            </a:clrChange>
+            <a:duotone>
+              <a:schemeClr val="accent1">
+                <a:shade val="45000"/>
+                <a:satMod val="135000"/>
+              </a:schemeClr>
+              <a:prstClr val="white"/>
+            </a:duotone>
+            <a:extLst>
+              <a:ext uri="{28A0092B-C50C-407E-A947-70E740481C1C}">
+                <a14:useLocalDpi xmlns:a14="http://schemas.microsoft.com/office/drawing/2010/main" val="0"/>
+              </a:ext>
+            </a:extLst>
+          </a:blip>
+          <a:srcRect l="6075" t="33799" r="4933" b="28690"/>
+          <a:stretch/>
+        </p:blipFill>
+        <p:spPr>
+          <a:xfrm>
+            <a:off x="2133601" y="4038600"/>
+            <a:ext cx="457198" cy="428266"/>
           </a:xfrm>
           <a:prstGeom prst="rect">
             <a:avLst/>

</xml_diff>